<commit_message>
rmse for 12 months
</commit_message>
<xml_diff>
--- a/presentationCapston.pptx
+++ b/presentationCapston.pptx
@@ -10,6 +10,11 @@
     <p:sldId id="258" r:id="rId4"/>
     <p:sldId id="259" r:id="rId5"/>
     <p:sldId id="260" r:id="rId6"/>
+    <p:sldId id="261" r:id="rId7"/>
+    <p:sldId id="262" r:id="rId8"/>
+    <p:sldId id="263" r:id="rId9"/>
+    <p:sldId id="264" r:id="rId10"/>
+    <p:sldId id="265" r:id="rId11"/>
   </p:sldIdLst>
   <p:sldSz cx="12192000" cy="6858000"/>
   <p:notesSz cx="6858000" cy="9144000"/>
@@ -108,6 +113,11 @@
       </a:defRPr>
     </a:lvl9pPr>
   </p:defaultTextStyle>
+  <p:extLst>
+    <p:ext uri="{EFAFB233-063F-42B5-8137-9DF3F51BA10A}">
+      <p15:sldGuideLst xmlns:p15="http://schemas.microsoft.com/office/powerpoint/2012/main"/>
+    </p:ext>
+  </p:extLst>
 </p:presentation>
 </file>
 
@@ -6037,7 +6047,7 @@
           <a:p>
             <a:fld id="{76969C88-B244-455D-A017-012B25B1ACDD}" type="datetimeFigureOut">
               <a:rPr lang="en-US" smtClean="0"/>
-              <a:t>12/1/20</a:t>
+              <a:t>12/8/20</a:t>
             </a:fld>
             <a:endParaRPr lang="en-US"/>
           </a:p>
@@ -6235,7 +6245,7 @@
           <a:p>
             <a:fld id="{76969C88-B244-455D-A017-012B25B1ACDD}" type="datetimeFigureOut">
               <a:rPr lang="en-US" smtClean="0"/>
-              <a:t>12/1/20</a:t>
+              <a:t>12/8/20</a:t>
             </a:fld>
             <a:endParaRPr lang="en-US"/>
           </a:p>
@@ -6443,7 +6453,7 @@
           <a:p>
             <a:fld id="{76969C88-B244-455D-A017-012B25B1ACDD}" type="datetimeFigureOut">
               <a:rPr lang="en-US" smtClean="0"/>
-              <a:t>12/1/20</a:t>
+              <a:t>12/8/20</a:t>
             </a:fld>
             <a:endParaRPr lang="en-US"/>
           </a:p>
@@ -6642,7 +6652,7 @@
           <a:p>
             <a:fld id="{76969C88-B244-455D-A017-012B25B1ACDD}" type="datetimeFigureOut">
               <a:rPr lang="en-US" smtClean="0"/>
-              <a:t>12/1/20</a:t>
+              <a:t>12/8/20</a:t>
             </a:fld>
             <a:endParaRPr lang="en-US"/>
           </a:p>
@@ -6917,7 +6927,7 @@
           <a:p>
             <a:fld id="{76969C88-B244-455D-A017-012B25B1ACDD}" type="datetimeFigureOut">
               <a:rPr lang="en-US" smtClean="0"/>
-              <a:t>12/1/20</a:t>
+              <a:t>12/8/20</a:t>
             </a:fld>
             <a:endParaRPr lang="en-US"/>
           </a:p>
@@ -7182,7 +7192,7 @@
           <a:p>
             <a:fld id="{76969C88-B244-455D-A017-012B25B1ACDD}" type="datetimeFigureOut">
               <a:rPr lang="en-US" smtClean="0"/>
-              <a:t>12/1/20</a:t>
+              <a:t>12/8/20</a:t>
             </a:fld>
             <a:endParaRPr lang="en-US"/>
           </a:p>
@@ -7594,7 +7604,7 @@
           <a:p>
             <a:fld id="{76969C88-B244-455D-A017-012B25B1ACDD}" type="datetimeFigureOut">
               <a:rPr lang="en-US" smtClean="0"/>
-              <a:t>12/1/20</a:t>
+              <a:t>12/8/20</a:t>
             </a:fld>
             <a:endParaRPr lang="en-US"/>
           </a:p>
@@ -7735,7 +7745,7 @@
           <a:p>
             <a:fld id="{76969C88-B244-455D-A017-012B25B1ACDD}" type="datetimeFigureOut">
               <a:rPr lang="en-US" smtClean="0"/>
-              <a:t>12/1/20</a:t>
+              <a:t>12/8/20</a:t>
             </a:fld>
             <a:endParaRPr lang="en-US"/>
           </a:p>
@@ -7848,7 +7858,7 @@
           <a:p>
             <a:fld id="{76969C88-B244-455D-A017-012B25B1ACDD}" type="datetimeFigureOut">
               <a:rPr lang="en-US" smtClean="0"/>
-              <a:t>12/1/20</a:t>
+              <a:t>12/8/20</a:t>
             </a:fld>
             <a:endParaRPr lang="en-US"/>
           </a:p>
@@ -8160,7 +8170,7 @@
           <a:p>
             <a:fld id="{76969C88-B244-455D-A017-012B25B1ACDD}" type="datetimeFigureOut">
               <a:rPr lang="en-US" smtClean="0"/>
-              <a:t>12/1/20</a:t>
+              <a:t>12/8/20</a:t>
             </a:fld>
             <a:endParaRPr lang="en-US"/>
           </a:p>
@@ -8451,7 +8461,7 @@
           <a:p>
             <a:fld id="{76969C88-B244-455D-A017-012B25B1ACDD}" type="datetimeFigureOut">
               <a:rPr lang="en-US" smtClean="0"/>
-              <a:t>12/1/20</a:t>
+              <a:t>12/8/20</a:t>
             </a:fld>
             <a:endParaRPr lang="en-US"/>
           </a:p>
@@ -9207,7 +9217,7 @@
             <a:fld id="{76969C88-B244-455D-A017-012B25B1ACDD}" type="datetimeFigureOut">
               <a:rPr lang="en-US" smtClean="0"/>
               <a:pPr/>
-              <a:t>12/1/20</a:t>
+              <a:t>12/8/20</a:t>
             </a:fld>
             <a:endParaRPr lang="en-US"/>
           </a:p>
@@ -10239,6 +10249,564 @@
 </p:sld>
 </file>
 
+<file path=ppt/slides/slide10.xml><?xml version="1.0" encoding="utf-8"?>
+<p:sld xmlns:a="http://schemas.openxmlformats.org/drawingml/2006/main" xmlns:r="http://schemas.openxmlformats.org/officeDocument/2006/relationships" xmlns:p="http://schemas.openxmlformats.org/presentationml/2006/main">
+  <p:cSld>
+    <p:bg>
+      <p:bgPr>
+        <a:solidFill>
+          <a:schemeClr val="bg2"/>
+        </a:solidFill>
+        <a:effectLst/>
+      </p:bgPr>
+    </p:bg>
+    <p:spTree>
+      <p:nvGrpSpPr>
+        <p:cNvPr id="1" name=""/>
+        <p:cNvGrpSpPr/>
+        <p:nvPr/>
+      </p:nvGrpSpPr>
+      <p:grpSpPr>
+        <a:xfrm>
+          <a:off x="0" y="0"/>
+          <a:ext cx="0" cy="0"/>
+          <a:chOff x="0" y="0"/>
+          <a:chExt cx="0" cy="0"/>
+        </a:xfrm>
+      </p:grpSpPr>
+      <p:sp useBgFill="1">
+        <p:nvSpPr>
+          <p:cNvPr id="12" name="Rectangle 11">
+            <a:extLst>
+              <a:ext uri="{FF2B5EF4-FFF2-40B4-BE49-F238E27FC236}">
+                <a16:creationId xmlns:a16="http://schemas.microsoft.com/office/drawing/2014/main" id="{987A0FBA-CC04-4256-A8EB-BB3C543E989C}"/>
+              </a:ext>
+              <a:ext uri="{C183D7F6-B498-43B3-948B-1728B52AA6E4}">
+                <adec:decorative xmlns:adec="http://schemas.microsoft.com/office/drawing/2017/decorative" val="1"/>
+              </a:ext>
+            </a:extLst>
+          </p:cNvPr>
+          <p:cNvSpPr>
+            <a:spLocks noGrp="1" noRot="1" noChangeAspect="1" noMove="1" noResize="1" noEditPoints="1" noAdjustHandles="1" noChangeArrowheads="1" noChangeShapeType="1" noTextEdit="1"/>
+          </p:cNvSpPr>
+          <p:nvPr>
+            <p:extLst>
+              <p:ext uri="{386F3935-93C4-4BCD-93E2-E3B085C9AB24}">
+                <p16:designElem xmlns:p16="http://schemas.microsoft.com/office/powerpoint/2015/main" val="1"/>
+              </p:ext>
+            </p:extLst>
+          </p:nvPr>
+        </p:nvSpPr>
+        <p:spPr>
+          <a:xfrm>
+            <a:off x="0" y="0"/>
+            <a:ext cx="12192000" cy="6858000"/>
+          </a:xfrm>
+          <a:prstGeom prst="rect">
+            <a:avLst/>
+          </a:prstGeom>
+          <a:ln w="12700" cap="flat" cmpd="sng" algn="ctr">
+            <a:noFill/>
+            <a:prstDash val="solid"/>
+            <a:miter lim="800000"/>
+          </a:ln>
+          <a:effectLst/>
+          <a:extLst>
+            <a:ext uri="{91240B29-F687-4F45-9708-019B960494DF}">
+              <a14:hiddenLine xmlns:a14="http://schemas.microsoft.com/office/drawing/2010/main" w="12700" cap="flat" cmpd="sng" algn="ctr">
+                <a:solidFill>
+                  <a:schemeClr val="accent1">
+                    <a:shade val="50000"/>
+                  </a:schemeClr>
+                </a:solidFill>
+                <a:prstDash val="solid"/>
+                <a:miter lim="800000"/>
+              </a14:hiddenLine>
+            </a:ext>
+          </a:extLst>
+        </p:spPr>
+        <p:style>
+          <a:lnRef idx="2">
+            <a:schemeClr val="accent1">
+              <a:shade val="50000"/>
+            </a:schemeClr>
+          </a:lnRef>
+          <a:fillRef idx="1">
+            <a:schemeClr val="accent1"/>
+          </a:fillRef>
+          <a:effectRef idx="0">
+            <a:schemeClr val="accent1"/>
+          </a:effectRef>
+          <a:fontRef idx="minor">
+            <a:schemeClr val="lt1"/>
+          </a:fontRef>
+        </p:style>
+        <p:txBody>
+          <a:bodyPr rtlCol="0" anchor="ctr"/>
+          <a:lstStyle/>
+          <a:p>
+            <a:pPr algn="ctr"/>
+            <a:endParaRPr lang="en-US"/>
+          </a:p>
+        </p:txBody>
+      </p:sp>
+      <p:sp>
+        <p:nvSpPr>
+          <p:cNvPr id="14" name="Freeform: Shape 13">
+            <a:extLst>
+              <a:ext uri="{FF2B5EF4-FFF2-40B4-BE49-F238E27FC236}">
+                <a16:creationId xmlns:a16="http://schemas.microsoft.com/office/drawing/2014/main" id="{3D065C6D-EB42-400B-99C4-D0ACE936F6C3}"/>
+              </a:ext>
+              <a:ext uri="{C183D7F6-B498-43B3-948B-1728B52AA6E4}">
+                <adec:decorative xmlns:adec="http://schemas.microsoft.com/office/drawing/2017/decorative" val="1"/>
+              </a:ext>
+            </a:extLst>
+          </p:cNvPr>
+          <p:cNvSpPr>
+            <a:spLocks noGrp="1" noRot="1" noChangeAspect="1" noMove="1" noResize="1" noEditPoints="1" noAdjustHandles="1" noChangeArrowheads="1" noChangeShapeType="1" noTextEdit="1"/>
+          </p:cNvSpPr>
+          <p:nvPr>
+            <p:extLst>
+              <p:ext uri="{386F3935-93C4-4BCD-93E2-E3B085C9AB24}">
+                <p16:designElem xmlns:p16="http://schemas.microsoft.com/office/powerpoint/2015/main" val="1"/>
+              </p:ext>
+            </p:extLst>
+          </p:nvPr>
+        </p:nvSpPr>
+        <p:spPr>
+          <a:xfrm>
+            <a:off x="6613174" y="0"/>
+            <a:ext cx="5578824" cy="6028256"/>
+          </a:xfrm>
+          <a:custGeom>
+            <a:avLst/>
+            <a:gdLst>
+              <a:gd name="connsiteX0" fmla="*/ 1681218 w 5578824"/>
+              <a:gd name="connsiteY0" fmla="*/ 0 h 6028256"/>
+              <a:gd name="connsiteX1" fmla="*/ 5578824 w 5578824"/>
+              <a:gd name="connsiteY1" fmla="*/ 0 h 6028256"/>
+              <a:gd name="connsiteX2" fmla="*/ 5578824 w 5578824"/>
+              <a:gd name="connsiteY2" fmla="*/ 5760161 h 6028256"/>
+              <a:gd name="connsiteX3" fmla="*/ 5441231 w 5578824"/>
+              <a:gd name="connsiteY3" fmla="*/ 5804042 h 6028256"/>
+              <a:gd name="connsiteX4" fmla="*/ 4253224 w 5578824"/>
+              <a:gd name="connsiteY4" fmla="*/ 5980388 h 6028256"/>
+              <a:gd name="connsiteX5" fmla="*/ 837278 w 5578824"/>
+              <a:gd name="connsiteY5" fmla="*/ 4877588 h 6028256"/>
+              <a:gd name="connsiteX6" fmla="*/ 109626 w 5578824"/>
+              <a:gd name="connsiteY6" fmla="*/ 3329255 h 6028256"/>
+              <a:gd name="connsiteX7" fmla="*/ 156962 w 5578824"/>
+              <a:gd name="connsiteY7" fmla="*/ 1773839 h 6028256"/>
+              <a:gd name="connsiteX8" fmla="*/ 904890 w 5578824"/>
+              <a:gd name="connsiteY8" fmla="*/ 738354 h 6028256"/>
+              <a:gd name="connsiteX9" fmla="*/ 1304592 w 5578824"/>
+              <a:gd name="connsiteY9" fmla="*/ 360545 h 6028256"/>
+            </a:gdLst>
+            <a:ahLst/>
+            <a:cxnLst>
+              <a:cxn ang="0">
+                <a:pos x="connsiteX0" y="connsiteY0"/>
+              </a:cxn>
+              <a:cxn ang="0">
+                <a:pos x="connsiteX1" y="connsiteY1"/>
+              </a:cxn>
+              <a:cxn ang="0">
+                <a:pos x="connsiteX2" y="connsiteY2"/>
+              </a:cxn>
+              <a:cxn ang="0">
+                <a:pos x="connsiteX3" y="connsiteY3"/>
+              </a:cxn>
+              <a:cxn ang="0">
+                <a:pos x="connsiteX4" y="connsiteY4"/>
+              </a:cxn>
+              <a:cxn ang="0">
+                <a:pos x="connsiteX5" y="connsiteY5"/>
+              </a:cxn>
+              <a:cxn ang="0">
+                <a:pos x="connsiteX6" y="connsiteY6"/>
+              </a:cxn>
+              <a:cxn ang="0">
+                <a:pos x="connsiteX7" y="connsiteY7"/>
+              </a:cxn>
+              <a:cxn ang="0">
+                <a:pos x="connsiteX8" y="connsiteY8"/>
+              </a:cxn>
+              <a:cxn ang="0">
+                <a:pos x="connsiteX9" y="connsiteY9"/>
+              </a:cxn>
+            </a:cxnLst>
+            <a:rect l="l" t="t" r="r" b="b"/>
+            <a:pathLst>
+              <a:path w="5578824" h="6028256">
+                <a:moveTo>
+                  <a:pt x="1681218" y="0"/>
+                </a:moveTo>
+                <a:lnTo>
+                  <a:pt x="5578824" y="0"/>
+                </a:lnTo>
+                <a:lnTo>
+                  <a:pt x="5578824" y="5760161"/>
+                </a:lnTo>
+                <a:lnTo>
+                  <a:pt x="5441231" y="5804042"/>
+                </a:lnTo>
+                <a:cubicBezTo>
+                  <a:pt x="5079089" y="5907589"/>
+                  <a:pt x="4674877" y="5944442"/>
+                  <a:pt x="4253224" y="5980388"/>
+                </a:cubicBezTo>
+                <a:cubicBezTo>
+                  <a:pt x="2813852" y="6102970"/>
+                  <a:pt x="1551586" y="6071494"/>
+                  <a:pt x="837278" y="4877588"/>
+                </a:cubicBezTo>
+                <a:cubicBezTo>
+                  <a:pt x="529862" y="4363935"/>
+                  <a:pt x="255162" y="3847185"/>
+                  <a:pt x="109626" y="3329255"/>
+                </a:cubicBezTo>
+                <a:cubicBezTo>
+                  <a:pt x="-35907" y="2811325"/>
+                  <a:pt x="-52277" y="2292214"/>
+                  <a:pt x="156962" y="1773839"/>
+                </a:cubicBezTo>
+                <a:cubicBezTo>
+                  <a:pt x="296494" y="1428108"/>
+                  <a:pt x="536161" y="1082881"/>
+                  <a:pt x="904890" y="738354"/>
+                </a:cubicBezTo>
+                <a:cubicBezTo>
+                  <a:pt x="1036690" y="615181"/>
+                  <a:pt x="1169968" y="488910"/>
+                  <a:pt x="1304592" y="360545"/>
+                </a:cubicBezTo>
+                <a:close/>
+              </a:path>
+            </a:pathLst>
+          </a:custGeom>
+          <a:solidFill>
+            <a:schemeClr val="accent6"/>
+          </a:solidFill>
+          <a:ln>
+            <a:noFill/>
+          </a:ln>
+        </p:spPr>
+        <p:style>
+          <a:lnRef idx="2">
+            <a:schemeClr val="accent1">
+              <a:shade val="50000"/>
+            </a:schemeClr>
+          </a:lnRef>
+          <a:fillRef idx="1">
+            <a:schemeClr val="accent1"/>
+          </a:fillRef>
+          <a:effectRef idx="0">
+            <a:schemeClr val="accent1"/>
+          </a:effectRef>
+          <a:fontRef idx="minor">
+            <a:schemeClr val="lt1"/>
+          </a:fontRef>
+        </p:style>
+        <p:txBody>
+          <a:bodyPr wrap="square" rtlCol="0" anchor="ctr">
+            <a:noAutofit/>
+          </a:bodyPr>
+          <a:lstStyle/>
+          <a:p>
+            <a:pPr algn="ctr"/>
+            <a:endParaRPr lang="en-US"/>
+          </a:p>
+        </p:txBody>
+      </p:sp>
+      <p:sp>
+        <p:nvSpPr>
+          <p:cNvPr id="16" name="Freeform: Shape 15">
+            <a:extLst>
+              <a:ext uri="{FF2B5EF4-FFF2-40B4-BE49-F238E27FC236}">
+                <a16:creationId xmlns:a16="http://schemas.microsoft.com/office/drawing/2014/main" id="{3362A0EA-3E81-4464-94B8-70BE5870EDC0}"/>
+              </a:ext>
+              <a:ext uri="{C183D7F6-B498-43B3-948B-1728B52AA6E4}">
+                <adec:decorative xmlns:adec="http://schemas.microsoft.com/office/drawing/2017/decorative" val="1"/>
+              </a:ext>
+            </a:extLst>
+          </p:cNvPr>
+          <p:cNvSpPr>
+            <a:spLocks noGrp="1" noRot="1" noChangeAspect="1" noMove="1" noResize="1" noEditPoints="1" noAdjustHandles="1" noChangeArrowheads="1" noChangeShapeType="1" noTextEdit="1"/>
+          </p:cNvSpPr>
+          <p:nvPr>
+            <p:extLst>
+              <p:ext uri="{386F3935-93C4-4BCD-93E2-E3B085C9AB24}">
+                <p16:designElem xmlns:p16="http://schemas.microsoft.com/office/powerpoint/2015/main" val="1"/>
+              </p:ext>
+            </p:extLst>
+          </p:nvPr>
+        </p:nvSpPr>
+        <p:spPr>
+          <a:xfrm flipH="1">
+            <a:off x="6487883" y="0"/>
+            <a:ext cx="5704117" cy="6096000"/>
+          </a:xfrm>
+          <a:custGeom>
+            <a:avLst/>
+            <a:gdLst>
+              <a:gd name="connsiteX0" fmla="*/ 0 w 5704117"/>
+              <a:gd name="connsiteY0" fmla="*/ 0 h 6096000"/>
+              <a:gd name="connsiteX1" fmla="*/ 4562795 w 5704117"/>
+              <a:gd name="connsiteY1" fmla="*/ 0 h 6096000"/>
+              <a:gd name="connsiteX2" fmla="*/ 4721192 w 5704117"/>
+              <a:gd name="connsiteY2" fmla="*/ 133595 h 6096000"/>
+              <a:gd name="connsiteX3" fmla="*/ 5467522 w 5704117"/>
+              <a:gd name="connsiteY3" fmla="*/ 1054328 h 6096000"/>
+              <a:gd name="connsiteX4" fmla="*/ 5538873 w 5704117"/>
+              <a:gd name="connsiteY4" fmla="*/ 2897564 h 6096000"/>
+              <a:gd name="connsiteX5" fmla="*/ 4442050 w 5704117"/>
+              <a:gd name="connsiteY5" fmla="*/ 4732407 h 6096000"/>
+              <a:gd name="connsiteX6" fmla="*/ 93046 w 5704117"/>
+              <a:gd name="connsiteY6" fmla="*/ 6082857 h 6096000"/>
+              <a:gd name="connsiteX7" fmla="*/ 0 w 5704117"/>
+              <a:gd name="connsiteY7" fmla="*/ 6078450 h 6096000"/>
+              <a:gd name="connsiteX0" fmla="*/ 4562795 w 5704117"/>
+              <a:gd name="connsiteY0" fmla="*/ 0 h 6096000"/>
+              <a:gd name="connsiteX1" fmla="*/ 4721192 w 5704117"/>
+              <a:gd name="connsiteY1" fmla="*/ 133595 h 6096000"/>
+              <a:gd name="connsiteX2" fmla="*/ 5467522 w 5704117"/>
+              <a:gd name="connsiteY2" fmla="*/ 1054328 h 6096000"/>
+              <a:gd name="connsiteX3" fmla="*/ 5538873 w 5704117"/>
+              <a:gd name="connsiteY3" fmla="*/ 2897564 h 6096000"/>
+              <a:gd name="connsiteX4" fmla="*/ 4442050 w 5704117"/>
+              <a:gd name="connsiteY4" fmla="*/ 4732407 h 6096000"/>
+              <a:gd name="connsiteX5" fmla="*/ 93046 w 5704117"/>
+              <a:gd name="connsiteY5" fmla="*/ 6082857 h 6096000"/>
+              <a:gd name="connsiteX6" fmla="*/ 0 w 5704117"/>
+              <a:gd name="connsiteY6" fmla="*/ 6078450 h 6096000"/>
+              <a:gd name="connsiteX7" fmla="*/ 91440 w 5704117"/>
+              <a:gd name="connsiteY7" fmla="*/ 91440 h 6096000"/>
+              <a:gd name="connsiteX0" fmla="*/ 4562795 w 5704117"/>
+              <a:gd name="connsiteY0" fmla="*/ 0 h 6096000"/>
+              <a:gd name="connsiteX1" fmla="*/ 4721192 w 5704117"/>
+              <a:gd name="connsiteY1" fmla="*/ 133595 h 6096000"/>
+              <a:gd name="connsiteX2" fmla="*/ 5467522 w 5704117"/>
+              <a:gd name="connsiteY2" fmla="*/ 1054328 h 6096000"/>
+              <a:gd name="connsiteX3" fmla="*/ 5538873 w 5704117"/>
+              <a:gd name="connsiteY3" fmla="*/ 2897564 h 6096000"/>
+              <a:gd name="connsiteX4" fmla="*/ 4442050 w 5704117"/>
+              <a:gd name="connsiteY4" fmla="*/ 4732407 h 6096000"/>
+              <a:gd name="connsiteX5" fmla="*/ 93046 w 5704117"/>
+              <a:gd name="connsiteY5" fmla="*/ 6082857 h 6096000"/>
+              <a:gd name="connsiteX6" fmla="*/ 0 w 5704117"/>
+              <a:gd name="connsiteY6" fmla="*/ 6078450 h 6096000"/>
+            </a:gdLst>
+            <a:ahLst/>
+            <a:cxnLst>
+              <a:cxn ang="0">
+                <a:pos x="connsiteX0" y="connsiteY0"/>
+              </a:cxn>
+              <a:cxn ang="0">
+                <a:pos x="connsiteX1" y="connsiteY1"/>
+              </a:cxn>
+              <a:cxn ang="0">
+                <a:pos x="connsiteX2" y="connsiteY2"/>
+              </a:cxn>
+              <a:cxn ang="0">
+                <a:pos x="connsiteX3" y="connsiteY3"/>
+              </a:cxn>
+              <a:cxn ang="0">
+                <a:pos x="connsiteX4" y="connsiteY4"/>
+              </a:cxn>
+              <a:cxn ang="0">
+                <a:pos x="connsiteX5" y="connsiteY5"/>
+              </a:cxn>
+              <a:cxn ang="0">
+                <a:pos x="connsiteX6" y="connsiteY6"/>
+              </a:cxn>
+            </a:cxnLst>
+            <a:rect l="l" t="t" r="r" b="b"/>
+            <a:pathLst>
+              <a:path w="5704117" h="6096000">
+                <a:moveTo>
+                  <a:pt x="4562795" y="0"/>
+                </a:moveTo>
+                <a:lnTo>
+                  <a:pt x="4721192" y="133595"/>
+                </a:lnTo>
+                <a:cubicBezTo>
+                  <a:pt x="5067135" y="440105"/>
+                  <a:pt x="5309779" y="747048"/>
+                  <a:pt x="5467522" y="1054328"/>
+                </a:cubicBezTo>
+                <a:cubicBezTo>
+                  <a:pt x="5782917" y="1668625"/>
+                  <a:pt x="5758242" y="2283795"/>
+                  <a:pt x="5538873" y="2897564"/>
+                </a:cubicBezTo>
+                <a:cubicBezTo>
+                  <a:pt x="5319500" y="3511334"/>
+                  <a:pt x="4905433" y="4123706"/>
+                  <a:pt x="4442050" y="4732407"/>
+                </a:cubicBezTo>
+                <a:cubicBezTo>
+                  <a:pt x="3499930" y="5970384"/>
+                  <a:pt x="1925433" y="6153690"/>
+                  <a:pt x="93046" y="6082857"/>
+                </a:cubicBezTo>
+                <a:lnTo>
+                  <a:pt x="0" y="6078450"/>
+                </a:lnTo>
+              </a:path>
+            </a:pathLst>
+          </a:custGeom>
+          <a:noFill/>
+          <a:ln w="19050">
+            <a:solidFill>
+              <a:schemeClr val="accent2">
+                <a:lumMod val="60000"/>
+                <a:lumOff val="40000"/>
+              </a:schemeClr>
+            </a:solidFill>
+          </a:ln>
+        </p:spPr>
+        <p:style>
+          <a:lnRef idx="2">
+            <a:schemeClr val="accent1">
+              <a:shade val="50000"/>
+            </a:schemeClr>
+          </a:lnRef>
+          <a:fillRef idx="1">
+            <a:schemeClr val="accent1"/>
+          </a:fillRef>
+          <a:effectRef idx="0">
+            <a:schemeClr val="accent1"/>
+          </a:effectRef>
+          <a:fontRef idx="minor">
+            <a:schemeClr val="lt1"/>
+          </a:fontRef>
+        </p:style>
+        <p:txBody>
+          <a:bodyPr wrap="square" rtlCol="0" anchor="ctr">
+            <a:noAutofit/>
+          </a:bodyPr>
+          <a:lstStyle/>
+          <a:p>
+            <a:pPr algn="ctr"/>
+            <a:endParaRPr lang="en-US">
+              <a:solidFill>
+                <a:prstClr val="white"/>
+              </a:solidFill>
+              <a:latin typeface="Avenir Next LT Pro Light"/>
+            </a:endParaRPr>
+          </a:p>
+        </p:txBody>
+      </p:sp>
+      <p:sp>
+        <p:nvSpPr>
+          <p:cNvPr id="9" name="Content Placeholder 8">
+            <a:extLst>
+              <a:ext uri="{FF2B5EF4-FFF2-40B4-BE49-F238E27FC236}">
+                <a16:creationId xmlns:a16="http://schemas.microsoft.com/office/drawing/2014/main" id="{1087605D-B774-45FD-AA0C-CDC44A2ABA92}"/>
+              </a:ext>
+            </a:extLst>
+          </p:cNvPr>
+          <p:cNvSpPr>
+            <a:spLocks noGrp="1"/>
+          </p:cNvSpPr>
+          <p:nvPr>
+            <p:ph idx="1"/>
+          </p:nvPr>
+        </p:nvSpPr>
+        <p:spPr>
+          <a:xfrm>
+            <a:off x="762000" y="2286000"/>
+            <a:ext cx="5334000" cy="3810001"/>
+          </a:xfrm>
+        </p:spPr>
+        <p:txBody>
+          <a:bodyPr>
+            <a:normAutofit/>
+          </a:bodyPr>
+          <a:lstStyle/>
+          <a:p>
+            <a:endParaRPr lang="en-US" sz="2400"/>
+          </a:p>
+        </p:txBody>
+      </p:sp>
+      <p:sp>
+        <p:nvSpPr>
+          <p:cNvPr id="2" name="Title 1">
+            <a:extLst>
+              <a:ext uri="{FF2B5EF4-FFF2-40B4-BE49-F238E27FC236}">
+                <a16:creationId xmlns:a16="http://schemas.microsoft.com/office/drawing/2014/main" id="{4BECBB28-6A5F-8647-8577-550BAD8DB922}"/>
+              </a:ext>
+            </a:extLst>
+          </p:cNvPr>
+          <p:cNvSpPr>
+            <a:spLocks noGrp="1"/>
+          </p:cNvSpPr>
+          <p:nvPr>
+            <p:ph type="title"/>
+          </p:nvPr>
+        </p:nvSpPr>
+        <p:spPr>
+          <a:xfrm>
+            <a:off x="762000" y="762000"/>
+            <a:ext cx="5334000" cy="1524000"/>
+          </a:xfrm>
+        </p:spPr>
+        <p:txBody>
+          <a:bodyPr>
+            <a:normAutofit/>
+          </a:bodyPr>
+          <a:lstStyle/>
+          <a:p>
+            <a:r>
+              <a:rPr lang="en-US" sz="3200"/>
+              <a:t>Prediction vs Actual </a:t>
+            </a:r>
+          </a:p>
+        </p:txBody>
+      </p:sp>
+      <p:pic>
+        <p:nvPicPr>
+          <p:cNvPr id="5" name="Content Placeholder 4" descr="Chart&#10;&#10;Description automatically generated">
+            <a:extLst>
+              <a:ext uri="{FF2B5EF4-FFF2-40B4-BE49-F238E27FC236}">
+                <a16:creationId xmlns:a16="http://schemas.microsoft.com/office/drawing/2014/main" id="{D04CBE76-D95F-5744-ADE5-92189596B7E7}"/>
+              </a:ext>
+            </a:extLst>
+          </p:cNvPr>
+          <p:cNvPicPr>
+            <a:picLocks noChangeAspect="1"/>
+          </p:cNvPicPr>
+          <p:nvPr/>
+        </p:nvPicPr>
+        <p:blipFill>
+          <a:blip r:embed="rId2"/>
+          <a:stretch>
+            <a:fillRect/>
+          </a:stretch>
+        </p:blipFill>
+        <p:spPr>
+          <a:xfrm>
+            <a:off x="627529" y="2085641"/>
+            <a:ext cx="10936941" cy="4019324"/>
+          </a:xfrm>
+          <a:prstGeom prst="rect">
+            <a:avLst/>
+          </a:prstGeom>
+        </p:spPr>
+      </p:pic>
+    </p:spTree>
+    <p:extLst>
+      <p:ext uri="{BB962C8B-B14F-4D97-AF65-F5344CB8AC3E}">
+        <p14:creationId xmlns:p14="http://schemas.microsoft.com/office/powerpoint/2010/main" val="791808786"/>
+      </p:ext>
+    </p:extLst>
+  </p:cSld>
+  <p:clrMapOvr>
+    <a:masterClrMapping/>
+  </p:clrMapOvr>
+</p:sld>
+</file>
+
 <file path=ppt/slides/slide2.xml><?xml version="1.0" encoding="utf-8"?>
 <p:sld xmlns:a="http://schemas.openxmlformats.org/drawingml/2006/main" xmlns:r="http://schemas.openxmlformats.org/officeDocument/2006/relationships" xmlns:p="http://schemas.openxmlformats.org/presentationml/2006/main">
   <p:cSld>
@@ -12658,7 +13226,7 @@
           <a:p>
             <a:r>
               <a:rPr lang="en-US" dirty="0"/>
-              <a:t>Point Anomaly Detection  </a:t>
+              <a:t>Outlier Analysis</a:t>
             </a:r>
           </a:p>
         </p:txBody>
@@ -12684,6 +13252,27 @@
           <a:bodyPr/>
           <a:lstStyle/>
           <a:p>
+            <a:pPr marL="0" indent="0">
+              <a:buNone/>
+            </a:pPr>
+            <a:r>
+              <a:rPr lang="en-US" dirty="0"/>
+              <a:t>Point Anomaly Detection </a:t>
+            </a:r>
+          </a:p>
+          <a:p>
+            <a:pPr marL="0" indent="0">
+              <a:buNone/>
+            </a:pPr>
+            <a:r>
+              <a:rPr lang="en-US" dirty="0"/>
+              <a:t>Collective Anomaly Detection </a:t>
+            </a:r>
+          </a:p>
+          <a:p>
+            <a:pPr marL="0" indent="0">
+              <a:buNone/>
+            </a:pPr>
             <a:endParaRPr lang="en-US" dirty="0"/>
           </a:p>
         </p:txBody>
@@ -12692,6 +13281,1375 @@
     <p:extLst>
       <p:ext uri="{BB962C8B-B14F-4D97-AF65-F5344CB8AC3E}">
         <p14:creationId xmlns:p14="http://schemas.microsoft.com/office/powerpoint/2010/main" val="1057433142"/>
+      </p:ext>
+    </p:extLst>
+  </p:cSld>
+  <p:clrMapOvr>
+    <a:masterClrMapping/>
+  </p:clrMapOvr>
+</p:sld>
+</file>
+
+<file path=ppt/slides/slide6.xml><?xml version="1.0" encoding="utf-8"?>
+<p:sld xmlns:a="http://schemas.openxmlformats.org/drawingml/2006/main" xmlns:r="http://schemas.openxmlformats.org/officeDocument/2006/relationships" xmlns:p="http://schemas.openxmlformats.org/presentationml/2006/main">
+  <p:cSld>
+    <p:spTree>
+      <p:nvGrpSpPr>
+        <p:cNvPr id="1" name=""/>
+        <p:cNvGrpSpPr/>
+        <p:nvPr/>
+      </p:nvGrpSpPr>
+      <p:grpSpPr>
+        <a:xfrm>
+          <a:off x="0" y="0"/>
+          <a:ext cx="0" cy="0"/>
+          <a:chOff x="0" y="0"/>
+          <a:chExt cx="0" cy="0"/>
+        </a:xfrm>
+      </p:grpSpPr>
+      <p:sp>
+        <p:nvSpPr>
+          <p:cNvPr id="2" name="Title 1">
+            <a:extLst>
+              <a:ext uri="{FF2B5EF4-FFF2-40B4-BE49-F238E27FC236}">
+                <a16:creationId xmlns:a16="http://schemas.microsoft.com/office/drawing/2014/main" id="{713DBCC5-CEE5-014A-A2CB-DB298AB08A69}"/>
+              </a:ext>
+            </a:extLst>
+          </p:cNvPr>
+          <p:cNvSpPr>
+            <a:spLocks noGrp="1"/>
+          </p:cNvSpPr>
+          <p:nvPr>
+            <p:ph type="title"/>
+          </p:nvPr>
+        </p:nvSpPr>
+        <p:spPr/>
+        <p:txBody>
+          <a:bodyPr/>
+          <a:lstStyle/>
+          <a:p>
+            <a:r>
+              <a:rPr lang="en-US" dirty="0"/>
+              <a:t>Point Anomaly Detection </a:t>
+            </a:r>
+          </a:p>
+        </p:txBody>
+      </p:sp>
+      <p:pic>
+        <p:nvPicPr>
+          <p:cNvPr id="5" name="Content Placeholder 4" descr="Chart, histogram&#10;&#10;Description automatically generated">
+            <a:extLst>
+              <a:ext uri="{FF2B5EF4-FFF2-40B4-BE49-F238E27FC236}">
+                <a16:creationId xmlns:a16="http://schemas.microsoft.com/office/drawing/2014/main" id="{E7721BF0-9F58-3F4B-8122-81E45950CD8D}"/>
+              </a:ext>
+            </a:extLst>
+          </p:cNvPr>
+          <p:cNvPicPr>
+            <a:picLocks noGrp="1" noChangeAspect="1"/>
+          </p:cNvPicPr>
+          <p:nvPr>
+            <p:ph idx="1"/>
+          </p:nvPr>
+        </p:nvPicPr>
+        <p:blipFill>
+          <a:blip r:embed="rId2"/>
+          <a:stretch>
+            <a:fillRect/>
+          </a:stretch>
+        </p:blipFill>
+        <p:spPr>
+          <a:xfrm>
+            <a:off x="762000" y="1761119"/>
+            <a:ext cx="7629225" cy="4834666"/>
+          </a:xfrm>
+        </p:spPr>
+      </p:pic>
+    </p:spTree>
+    <p:extLst>
+      <p:ext uri="{BB962C8B-B14F-4D97-AF65-F5344CB8AC3E}">
+        <p14:creationId xmlns:p14="http://schemas.microsoft.com/office/powerpoint/2010/main" val="2560998011"/>
+      </p:ext>
+    </p:extLst>
+  </p:cSld>
+  <p:clrMapOvr>
+    <a:masterClrMapping/>
+  </p:clrMapOvr>
+</p:sld>
+</file>
+
+<file path=ppt/slides/slide7.xml><?xml version="1.0" encoding="utf-8"?>
+<p:sld xmlns:a="http://schemas.openxmlformats.org/drawingml/2006/main" xmlns:r="http://schemas.openxmlformats.org/officeDocument/2006/relationships" xmlns:p="http://schemas.openxmlformats.org/presentationml/2006/main">
+  <p:cSld>
+    <p:spTree>
+      <p:nvGrpSpPr>
+        <p:cNvPr id="1" name=""/>
+        <p:cNvGrpSpPr/>
+        <p:nvPr/>
+      </p:nvGrpSpPr>
+      <p:grpSpPr>
+        <a:xfrm>
+          <a:off x="0" y="0"/>
+          <a:ext cx="0" cy="0"/>
+          <a:chOff x="0" y="0"/>
+          <a:chExt cx="0" cy="0"/>
+        </a:xfrm>
+      </p:grpSpPr>
+      <p:sp>
+        <p:nvSpPr>
+          <p:cNvPr id="2" name="Title 1">
+            <a:extLst>
+              <a:ext uri="{FF2B5EF4-FFF2-40B4-BE49-F238E27FC236}">
+                <a16:creationId xmlns:a16="http://schemas.microsoft.com/office/drawing/2014/main" id="{DF389FB8-9513-7246-BFEA-5867427CB2DA}"/>
+              </a:ext>
+            </a:extLst>
+          </p:cNvPr>
+          <p:cNvSpPr>
+            <a:spLocks noGrp="1"/>
+          </p:cNvSpPr>
+          <p:nvPr>
+            <p:ph type="title"/>
+          </p:nvPr>
+        </p:nvSpPr>
+        <p:spPr/>
+        <p:txBody>
+          <a:bodyPr/>
+          <a:lstStyle/>
+          <a:p>
+            <a:r>
+              <a:rPr lang="en-US" dirty="0"/>
+              <a:t>Collective Anomaly Detection</a:t>
+            </a:r>
+          </a:p>
+        </p:txBody>
+      </p:sp>
+      <p:sp>
+        <p:nvSpPr>
+          <p:cNvPr id="3" name="Content Placeholder 2">
+            <a:extLst>
+              <a:ext uri="{FF2B5EF4-FFF2-40B4-BE49-F238E27FC236}">
+                <a16:creationId xmlns:a16="http://schemas.microsoft.com/office/drawing/2014/main" id="{D46E7871-D95E-644F-B0BF-97E5C390CB92}"/>
+              </a:ext>
+            </a:extLst>
+          </p:cNvPr>
+          <p:cNvSpPr>
+            <a:spLocks noGrp="1"/>
+          </p:cNvSpPr>
+          <p:nvPr>
+            <p:ph idx="1"/>
+          </p:nvPr>
+        </p:nvSpPr>
+        <p:spPr/>
+        <p:txBody>
+          <a:bodyPr/>
+          <a:lstStyle/>
+          <a:p>
+            <a:endParaRPr lang="en-US"/>
+          </a:p>
+        </p:txBody>
+      </p:sp>
+    </p:spTree>
+    <p:extLst>
+      <p:ext uri="{BB962C8B-B14F-4D97-AF65-F5344CB8AC3E}">
+        <p14:creationId xmlns:p14="http://schemas.microsoft.com/office/powerpoint/2010/main" val="1700645113"/>
+      </p:ext>
+    </p:extLst>
+  </p:cSld>
+  <p:clrMapOvr>
+    <a:masterClrMapping/>
+  </p:clrMapOvr>
+</p:sld>
+</file>
+
+<file path=ppt/slides/slide8.xml><?xml version="1.0" encoding="utf-8"?>
+<p:sld xmlns:a="http://schemas.openxmlformats.org/drawingml/2006/main" xmlns:r="http://schemas.openxmlformats.org/officeDocument/2006/relationships" xmlns:p="http://schemas.openxmlformats.org/presentationml/2006/main">
+  <p:cSld>
+    <p:bg>
+      <p:bgPr>
+        <a:solidFill>
+          <a:schemeClr val="bg2"/>
+        </a:solidFill>
+        <a:effectLst/>
+      </p:bgPr>
+    </p:bg>
+    <p:spTree>
+      <p:nvGrpSpPr>
+        <p:cNvPr id="1" name=""/>
+        <p:cNvGrpSpPr/>
+        <p:nvPr/>
+      </p:nvGrpSpPr>
+      <p:grpSpPr>
+        <a:xfrm>
+          <a:off x="0" y="0"/>
+          <a:ext cx="0" cy="0"/>
+          <a:chOff x="0" y="0"/>
+          <a:chExt cx="0" cy="0"/>
+        </a:xfrm>
+      </p:grpSpPr>
+      <p:sp useBgFill="1">
+        <p:nvSpPr>
+          <p:cNvPr id="39" name="Rectangle 30">
+            <a:extLst>
+              <a:ext uri="{FF2B5EF4-FFF2-40B4-BE49-F238E27FC236}">
+                <a16:creationId xmlns:a16="http://schemas.microsoft.com/office/drawing/2014/main" id="{075615F8-B807-416B-8DBB-536E4371AA51}"/>
+              </a:ext>
+              <a:ext uri="{C183D7F6-B498-43B3-948B-1728B52AA6E4}">
+                <adec:decorative xmlns:adec="http://schemas.microsoft.com/office/drawing/2017/decorative" val="1"/>
+              </a:ext>
+            </a:extLst>
+          </p:cNvPr>
+          <p:cNvSpPr>
+            <a:spLocks noGrp="1" noRot="1" noChangeAspect="1" noMove="1" noResize="1" noEditPoints="1" noAdjustHandles="1" noChangeArrowheads="1" noChangeShapeType="1" noTextEdit="1"/>
+          </p:cNvSpPr>
+          <p:nvPr>
+            <p:extLst>
+              <p:ext uri="{386F3935-93C4-4BCD-93E2-E3B085C9AB24}">
+                <p16:designElem xmlns:p16="http://schemas.microsoft.com/office/powerpoint/2015/main" val="1"/>
+              </p:ext>
+            </p:extLst>
+          </p:nvPr>
+        </p:nvSpPr>
+        <p:spPr>
+          <a:xfrm>
+            <a:off x="0" y="0"/>
+            <a:ext cx="12192000" cy="6858000"/>
+          </a:xfrm>
+          <a:prstGeom prst="rect">
+            <a:avLst/>
+          </a:prstGeom>
+          <a:ln w="12700" cap="flat" cmpd="sng" algn="ctr">
+            <a:noFill/>
+            <a:prstDash val="solid"/>
+            <a:miter lim="800000"/>
+          </a:ln>
+          <a:effectLst/>
+          <a:extLst>
+            <a:ext uri="{91240B29-F687-4F45-9708-019B960494DF}">
+              <a14:hiddenLine xmlns:a14="http://schemas.microsoft.com/office/drawing/2010/main" w="12700" cap="flat" cmpd="sng" algn="ctr">
+                <a:solidFill>
+                  <a:schemeClr val="accent1">
+                    <a:shade val="50000"/>
+                  </a:schemeClr>
+                </a:solidFill>
+                <a:prstDash val="solid"/>
+                <a:miter lim="800000"/>
+              </a14:hiddenLine>
+            </a:ext>
+          </a:extLst>
+        </p:spPr>
+        <p:style>
+          <a:lnRef idx="2">
+            <a:schemeClr val="accent1">
+              <a:shade val="50000"/>
+            </a:schemeClr>
+          </a:lnRef>
+          <a:fillRef idx="1">
+            <a:schemeClr val="accent1"/>
+          </a:fillRef>
+          <a:effectRef idx="0">
+            <a:schemeClr val="accent1"/>
+          </a:effectRef>
+          <a:fontRef idx="minor">
+            <a:schemeClr val="lt1"/>
+          </a:fontRef>
+        </p:style>
+        <p:txBody>
+          <a:bodyPr rtlCol="0" anchor="ctr"/>
+          <a:lstStyle/>
+          <a:p>
+            <a:pPr algn="ctr"/>
+            <a:endParaRPr lang="en-US"/>
+          </a:p>
+        </p:txBody>
+      </p:sp>
+      <p:sp>
+        <p:nvSpPr>
+          <p:cNvPr id="40" name="Freeform: Shape 32">
+            <a:extLst>
+              <a:ext uri="{FF2B5EF4-FFF2-40B4-BE49-F238E27FC236}">
+                <a16:creationId xmlns:a16="http://schemas.microsoft.com/office/drawing/2014/main" id="{F0B9DADA-7F03-4B7B-80A1-824C16E6771C}"/>
+              </a:ext>
+              <a:ext uri="{C183D7F6-B498-43B3-948B-1728B52AA6E4}">
+                <adec:decorative xmlns:adec="http://schemas.microsoft.com/office/drawing/2017/decorative" val="1"/>
+              </a:ext>
+            </a:extLst>
+          </p:cNvPr>
+          <p:cNvSpPr>
+            <a:spLocks noGrp="1" noRot="1" noChangeAspect="1" noMove="1" noResize="1" noEditPoints="1" noAdjustHandles="1" noChangeArrowheads="1" noChangeShapeType="1" noTextEdit="1"/>
+          </p:cNvSpPr>
+          <p:nvPr>
+            <p:extLst>
+              <p:ext uri="{386F3935-93C4-4BCD-93E2-E3B085C9AB24}">
+                <p16:designElem xmlns:p16="http://schemas.microsoft.com/office/powerpoint/2015/main" val="1"/>
+              </p:ext>
+            </p:extLst>
+          </p:nvPr>
+        </p:nvSpPr>
+        <p:spPr>
+          <a:xfrm>
+            <a:off x="6435910" y="2"/>
+            <a:ext cx="5756090" cy="3960681"/>
+          </a:xfrm>
+          <a:custGeom>
+            <a:avLst/>
+            <a:gdLst>
+              <a:gd name="connsiteX0" fmla="*/ 0 w 5756090"/>
+              <a:gd name="connsiteY0" fmla="*/ 0 h 3960681"/>
+              <a:gd name="connsiteX1" fmla="*/ 5756090 w 5756090"/>
+              <a:gd name="connsiteY1" fmla="*/ 0 h 3960681"/>
+              <a:gd name="connsiteX2" fmla="*/ 5756090 w 5756090"/>
+              <a:gd name="connsiteY2" fmla="*/ 3463038 h 3960681"/>
+              <a:gd name="connsiteX3" fmla="*/ 5558511 w 5756090"/>
+              <a:gd name="connsiteY3" fmla="*/ 3561320 h 3960681"/>
+              <a:gd name="connsiteX4" fmla="*/ 3480391 w 5756090"/>
+              <a:gd name="connsiteY4" fmla="*/ 3940416 h 3960681"/>
+              <a:gd name="connsiteX5" fmla="*/ 1605774 w 5756090"/>
+              <a:gd name="connsiteY5" fmla="*/ 2854397 h 3960681"/>
+              <a:gd name="connsiteX6" fmla="*/ 74389 w 5756090"/>
+              <a:gd name="connsiteY6" fmla="*/ 325223 h 3960681"/>
+              <a:gd name="connsiteX7" fmla="*/ 16895 w 5756090"/>
+              <a:gd name="connsiteY7" fmla="*/ 104576 h 3960681"/>
+              <a:gd name="connsiteX8" fmla="*/ 0 w 5756090"/>
+              <a:gd name="connsiteY8" fmla="*/ 0 h 3960681"/>
+            </a:gdLst>
+            <a:ahLst/>
+            <a:cxnLst>
+              <a:cxn ang="0">
+                <a:pos x="connsiteX0" y="connsiteY0"/>
+              </a:cxn>
+              <a:cxn ang="0">
+                <a:pos x="connsiteX1" y="connsiteY1"/>
+              </a:cxn>
+              <a:cxn ang="0">
+                <a:pos x="connsiteX2" y="connsiteY2"/>
+              </a:cxn>
+              <a:cxn ang="0">
+                <a:pos x="connsiteX3" y="connsiteY3"/>
+              </a:cxn>
+              <a:cxn ang="0">
+                <a:pos x="connsiteX4" y="connsiteY4"/>
+              </a:cxn>
+              <a:cxn ang="0">
+                <a:pos x="connsiteX5" y="connsiteY5"/>
+              </a:cxn>
+              <a:cxn ang="0">
+                <a:pos x="connsiteX6" y="connsiteY6"/>
+              </a:cxn>
+              <a:cxn ang="0">
+                <a:pos x="connsiteX7" y="connsiteY7"/>
+              </a:cxn>
+              <a:cxn ang="0">
+                <a:pos x="connsiteX8" y="connsiteY8"/>
+              </a:cxn>
+            </a:cxnLst>
+            <a:rect l="l" t="t" r="r" b="b"/>
+            <a:pathLst>
+              <a:path w="5756090" h="3960681">
+                <a:moveTo>
+                  <a:pt x="0" y="0"/>
+                </a:moveTo>
+                <a:lnTo>
+                  <a:pt x="5756090" y="0"/>
+                </a:lnTo>
+                <a:lnTo>
+                  <a:pt x="5756090" y="3463038"/>
+                </a:lnTo>
+                <a:lnTo>
+                  <a:pt x="5558511" y="3561320"/>
+                </a:lnTo>
+                <a:cubicBezTo>
+                  <a:pt x="4879339" y="3874528"/>
+                  <a:pt x="4103797" y="4016776"/>
+                  <a:pt x="3480391" y="3940416"/>
+                </a:cubicBezTo>
+                <a:cubicBezTo>
+                  <a:pt x="2751968" y="3851461"/>
+                  <a:pt x="2103010" y="3410677"/>
+                  <a:pt x="1605774" y="2854397"/>
+                </a:cubicBezTo>
+                <a:cubicBezTo>
+                  <a:pt x="1278696" y="2488237"/>
+                  <a:pt x="377050" y="1320622"/>
+                  <a:pt x="74389" y="325223"/>
+                </a:cubicBezTo>
+                <a:cubicBezTo>
+                  <a:pt x="51690" y="250568"/>
+                  <a:pt x="32361" y="176882"/>
+                  <a:pt x="16895" y="104576"/>
+                </a:cubicBezTo>
+                <a:lnTo>
+                  <a:pt x="0" y="0"/>
+                </a:lnTo>
+                <a:close/>
+              </a:path>
+            </a:pathLst>
+          </a:custGeom>
+          <a:solidFill>
+            <a:schemeClr val="accent6"/>
+          </a:solidFill>
+          <a:ln>
+            <a:noFill/>
+          </a:ln>
+        </p:spPr>
+        <p:style>
+          <a:lnRef idx="2">
+            <a:schemeClr val="accent1">
+              <a:shade val="50000"/>
+            </a:schemeClr>
+          </a:lnRef>
+          <a:fillRef idx="1">
+            <a:schemeClr val="accent1"/>
+          </a:fillRef>
+          <a:effectRef idx="0">
+            <a:schemeClr val="accent1"/>
+          </a:effectRef>
+          <a:fontRef idx="minor">
+            <a:schemeClr val="lt1"/>
+          </a:fontRef>
+        </p:style>
+        <p:txBody>
+          <a:bodyPr wrap="square" rtlCol="0" anchor="ctr">
+            <a:noAutofit/>
+          </a:bodyPr>
+          <a:lstStyle/>
+          <a:p>
+            <a:pPr algn="ctr"/>
+            <a:endParaRPr lang="en-US"/>
+          </a:p>
+        </p:txBody>
+      </p:sp>
+      <p:sp>
+        <p:nvSpPr>
+          <p:cNvPr id="41" name="Freeform: Shape 34">
+            <a:extLst>
+              <a:ext uri="{FF2B5EF4-FFF2-40B4-BE49-F238E27FC236}">
+                <a16:creationId xmlns:a16="http://schemas.microsoft.com/office/drawing/2014/main" id="{20758FF1-C584-443B-AD47-57B8F296C8A8}"/>
+              </a:ext>
+              <a:ext uri="{C183D7F6-B498-43B3-948B-1728B52AA6E4}">
+                <adec:decorative xmlns:adec="http://schemas.microsoft.com/office/drawing/2017/decorative" val="1"/>
+              </a:ext>
+            </a:extLst>
+          </p:cNvPr>
+          <p:cNvSpPr>
+            <a:spLocks noGrp="1" noRot="1" noChangeAspect="1" noMove="1" noResize="1" noEditPoints="1" noAdjustHandles="1" noChangeArrowheads="1" noChangeShapeType="1" noTextEdit="1"/>
+          </p:cNvSpPr>
+          <p:nvPr>
+            <p:extLst>
+              <p:ext uri="{386F3935-93C4-4BCD-93E2-E3B085C9AB24}">
+                <p16:designElem xmlns:p16="http://schemas.microsoft.com/office/powerpoint/2015/main" val="1"/>
+              </p:ext>
+            </p:extLst>
+          </p:nvPr>
+        </p:nvSpPr>
+        <p:spPr>
+          <a:xfrm>
+            <a:off x="6674051" y="-22158"/>
+            <a:ext cx="5517949" cy="4594156"/>
+          </a:xfrm>
+          <a:custGeom>
+            <a:avLst/>
+            <a:gdLst>
+              <a:gd name="connsiteX0" fmla="*/ 0 w 5756090"/>
+              <a:gd name="connsiteY0" fmla="*/ 0 h 3960681"/>
+              <a:gd name="connsiteX1" fmla="*/ 5756090 w 5756090"/>
+              <a:gd name="connsiteY1" fmla="*/ 0 h 3960681"/>
+              <a:gd name="connsiteX2" fmla="*/ 5756090 w 5756090"/>
+              <a:gd name="connsiteY2" fmla="*/ 3463038 h 3960681"/>
+              <a:gd name="connsiteX3" fmla="*/ 5558511 w 5756090"/>
+              <a:gd name="connsiteY3" fmla="*/ 3561320 h 3960681"/>
+              <a:gd name="connsiteX4" fmla="*/ 3480391 w 5756090"/>
+              <a:gd name="connsiteY4" fmla="*/ 3940416 h 3960681"/>
+              <a:gd name="connsiteX5" fmla="*/ 1605774 w 5756090"/>
+              <a:gd name="connsiteY5" fmla="*/ 2854397 h 3960681"/>
+              <a:gd name="connsiteX6" fmla="*/ 74389 w 5756090"/>
+              <a:gd name="connsiteY6" fmla="*/ 325223 h 3960681"/>
+              <a:gd name="connsiteX7" fmla="*/ 16895 w 5756090"/>
+              <a:gd name="connsiteY7" fmla="*/ 104576 h 3960681"/>
+              <a:gd name="connsiteX0" fmla="*/ 5739463 w 5739463"/>
+              <a:gd name="connsiteY0" fmla="*/ 0 h 3960681"/>
+              <a:gd name="connsiteX1" fmla="*/ 5739463 w 5739463"/>
+              <a:gd name="connsiteY1" fmla="*/ 3463038 h 3960681"/>
+              <a:gd name="connsiteX2" fmla="*/ 5541884 w 5739463"/>
+              <a:gd name="connsiteY2" fmla="*/ 3561320 h 3960681"/>
+              <a:gd name="connsiteX3" fmla="*/ 3463764 w 5739463"/>
+              <a:gd name="connsiteY3" fmla="*/ 3940416 h 3960681"/>
+              <a:gd name="connsiteX4" fmla="*/ 1589147 w 5739463"/>
+              <a:gd name="connsiteY4" fmla="*/ 2854397 h 3960681"/>
+              <a:gd name="connsiteX5" fmla="*/ 57762 w 5739463"/>
+              <a:gd name="connsiteY5" fmla="*/ 325223 h 3960681"/>
+              <a:gd name="connsiteX6" fmla="*/ 268 w 5739463"/>
+              <a:gd name="connsiteY6" fmla="*/ 104576 h 3960681"/>
+              <a:gd name="connsiteX7" fmla="*/ 79475 w 5739463"/>
+              <a:gd name="connsiteY7" fmla="*/ 79214 h 3960681"/>
+              <a:gd name="connsiteX0" fmla="*/ 5739195 w 5739195"/>
+              <a:gd name="connsiteY0" fmla="*/ 0 h 3960681"/>
+              <a:gd name="connsiteX1" fmla="*/ 5739195 w 5739195"/>
+              <a:gd name="connsiteY1" fmla="*/ 3463038 h 3960681"/>
+              <a:gd name="connsiteX2" fmla="*/ 5541616 w 5739195"/>
+              <a:gd name="connsiteY2" fmla="*/ 3561320 h 3960681"/>
+              <a:gd name="connsiteX3" fmla="*/ 3463496 w 5739195"/>
+              <a:gd name="connsiteY3" fmla="*/ 3940416 h 3960681"/>
+              <a:gd name="connsiteX4" fmla="*/ 1588879 w 5739195"/>
+              <a:gd name="connsiteY4" fmla="*/ 2854397 h 3960681"/>
+              <a:gd name="connsiteX5" fmla="*/ 57494 w 5739195"/>
+              <a:gd name="connsiteY5" fmla="*/ 325223 h 3960681"/>
+              <a:gd name="connsiteX6" fmla="*/ 0 w 5739195"/>
+              <a:gd name="connsiteY6" fmla="*/ 104576 h 3960681"/>
+              <a:gd name="connsiteX0" fmla="*/ 5739195 w 5739195"/>
+              <a:gd name="connsiteY0" fmla="*/ 3358462 h 3856105"/>
+              <a:gd name="connsiteX1" fmla="*/ 5541616 w 5739195"/>
+              <a:gd name="connsiteY1" fmla="*/ 3456744 h 3856105"/>
+              <a:gd name="connsiteX2" fmla="*/ 3463496 w 5739195"/>
+              <a:gd name="connsiteY2" fmla="*/ 3835840 h 3856105"/>
+              <a:gd name="connsiteX3" fmla="*/ 1588879 w 5739195"/>
+              <a:gd name="connsiteY3" fmla="*/ 2749821 h 3856105"/>
+              <a:gd name="connsiteX4" fmla="*/ 57494 w 5739195"/>
+              <a:gd name="connsiteY4" fmla="*/ 220647 h 3856105"/>
+              <a:gd name="connsiteX5" fmla="*/ 0 w 5739195"/>
+              <a:gd name="connsiteY5" fmla="*/ 0 h 3856105"/>
+              <a:gd name="connsiteX0" fmla="*/ 5799259 w 5799259"/>
+              <a:gd name="connsiteY0" fmla="*/ 3482233 h 3979876"/>
+              <a:gd name="connsiteX1" fmla="*/ 5601680 w 5799259"/>
+              <a:gd name="connsiteY1" fmla="*/ 3580515 h 3979876"/>
+              <a:gd name="connsiteX2" fmla="*/ 3523560 w 5799259"/>
+              <a:gd name="connsiteY2" fmla="*/ 3959611 h 3979876"/>
+              <a:gd name="connsiteX3" fmla="*/ 1648943 w 5799259"/>
+              <a:gd name="connsiteY3" fmla="*/ 2873592 h 3979876"/>
+              <a:gd name="connsiteX4" fmla="*/ 117558 w 5799259"/>
+              <a:gd name="connsiteY4" fmla="*/ 344418 h 3979876"/>
+              <a:gd name="connsiteX5" fmla="*/ 0 w 5799259"/>
+              <a:gd name="connsiteY5" fmla="*/ 0 h 3979876"/>
+            </a:gdLst>
+            <a:ahLst/>
+            <a:cxnLst>
+              <a:cxn ang="0">
+                <a:pos x="connsiteX0" y="connsiteY0"/>
+              </a:cxn>
+              <a:cxn ang="0">
+                <a:pos x="connsiteX1" y="connsiteY1"/>
+              </a:cxn>
+              <a:cxn ang="0">
+                <a:pos x="connsiteX2" y="connsiteY2"/>
+              </a:cxn>
+              <a:cxn ang="0">
+                <a:pos x="connsiteX3" y="connsiteY3"/>
+              </a:cxn>
+              <a:cxn ang="0">
+                <a:pos x="connsiteX4" y="connsiteY4"/>
+              </a:cxn>
+              <a:cxn ang="0">
+                <a:pos x="connsiteX5" y="connsiteY5"/>
+              </a:cxn>
+            </a:cxnLst>
+            <a:rect l="l" t="t" r="r" b="b"/>
+            <a:pathLst>
+              <a:path w="5799259" h="3979876">
+                <a:moveTo>
+                  <a:pt x="5799259" y="3482233"/>
+                </a:moveTo>
+                <a:lnTo>
+                  <a:pt x="5601680" y="3580515"/>
+                </a:lnTo>
+                <a:cubicBezTo>
+                  <a:pt x="4922508" y="3893723"/>
+                  <a:pt x="4146966" y="4035971"/>
+                  <a:pt x="3523560" y="3959611"/>
+                </a:cubicBezTo>
+                <a:cubicBezTo>
+                  <a:pt x="2795137" y="3870656"/>
+                  <a:pt x="2146179" y="3429872"/>
+                  <a:pt x="1648943" y="2873592"/>
+                </a:cubicBezTo>
+                <a:cubicBezTo>
+                  <a:pt x="1321865" y="2507432"/>
+                  <a:pt x="420219" y="1339817"/>
+                  <a:pt x="117558" y="344418"/>
+                </a:cubicBezTo>
+                <a:cubicBezTo>
+                  <a:pt x="94859" y="269763"/>
+                  <a:pt x="15466" y="72306"/>
+                  <a:pt x="0" y="0"/>
+                </a:cubicBezTo>
+              </a:path>
+            </a:pathLst>
+          </a:custGeom>
+          <a:noFill/>
+          <a:ln w="19050">
+            <a:solidFill>
+              <a:schemeClr val="accent2">
+                <a:lumMod val="60000"/>
+                <a:lumOff val="40000"/>
+              </a:schemeClr>
+            </a:solidFill>
+          </a:ln>
+        </p:spPr>
+        <p:style>
+          <a:lnRef idx="2">
+            <a:schemeClr val="accent1">
+              <a:shade val="50000"/>
+            </a:schemeClr>
+          </a:lnRef>
+          <a:fillRef idx="1">
+            <a:schemeClr val="accent1"/>
+          </a:fillRef>
+          <a:effectRef idx="0">
+            <a:schemeClr val="accent1"/>
+          </a:effectRef>
+          <a:fontRef idx="minor">
+            <a:schemeClr val="lt1"/>
+          </a:fontRef>
+        </p:style>
+        <p:txBody>
+          <a:bodyPr rtlCol="0" anchor="ctr"/>
+          <a:lstStyle/>
+          <a:p>
+            <a:pPr algn="ctr"/>
+            <a:endParaRPr lang="en-US">
+              <a:solidFill>
+                <a:prstClr val="white"/>
+              </a:solidFill>
+              <a:latin typeface="Avenir Next LT Pro Light"/>
+            </a:endParaRPr>
+          </a:p>
+        </p:txBody>
+      </p:sp>
+      <p:pic>
+        <p:nvPicPr>
+          <p:cNvPr id="7" name="Picture 6" descr="Chart, line chart&#10;&#10;Description automatically generated">
+            <a:extLst>
+              <a:ext uri="{FF2B5EF4-FFF2-40B4-BE49-F238E27FC236}">
+                <a16:creationId xmlns:a16="http://schemas.microsoft.com/office/drawing/2014/main" id="{76A5EF32-EC02-4A48-907B-F939F9E991E3}"/>
+              </a:ext>
+            </a:extLst>
+          </p:cNvPr>
+          <p:cNvPicPr>
+            <a:picLocks noChangeAspect="1"/>
+          </p:cNvPicPr>
+          <p:nvPr/>
+        </p:nvPicPr>
+        <p:blipFill>
+          <a:blip r:embed="rId2"/>
+          <a:stretch>
+            <a:fillRect/>
+          </a:stretch>
+        </p:blipFill>
+        <p:spPr>
+          <a:xfrm>
+            <a:off x="3751829" y="417449"/>
+            <a:ext cx="5481817" cy="3028701"/>
+          </a:xfrm>
+          <a:prstGeom prst="rect">
+            <a:avLst/>
+          </a:prstGeom>
+        </p:spPr>
+      </p:pic>
+      <p:sp>
+        <p:nvSpPr>
+          <p:cNvPr id="42" name="Freeform: Shape 36">
+            <a:extLst>
+              <a:ext uri="{FF2B5EF4-FFF2-40B4-BE49-F238E27FC236}">
+                <a16:creationId xmlns:a16="http://schemas.microsoft.com/office/drawing/2014/main" id="{6FFA88E0-67FD-4884-BFAB-507763DD8022}"/>
+              </a:ext>
+              <a:ext uri="{C183D7F6-B498-43B3-948B-1728B52AA6E4}">
+                <adec:decorative xmlns:adec="http://schemas.microsoft.com/office/drawing/2017/decorative" val="1"/>
+              </a:ext>
+            </a:extLst>
+          </p:cNvPr>
+          <p:cNvSpPr>
+            <a:spLocks noGrp="1" noRot="1" noChangeAspect="1" noMove="1" noResize="1" noEditPoints="1" noAdjustHandles="1" noChangeArrowheads="1" noChangeShapeType="1" noTextEdit="1"/>
+          </p:cNvSpPr>
+          <p:nvPr>
+            <p:extLst>
+              <p:ext uri="{386F3935-93C4-4BCD-93E2-E3B085C9AB24}">
+                <p16:designElem xmlns:p16="http://schemas.microsoft.com/office/powerpoint/2015/main" val="1"/>
+              </p:ext>
+            </p:extLst>
+          </p:nvPr>
+        </p:nvSpPr>
+        <p:spPr>
+          <a:xfrm>
+            <a:off x="3028871" y="4949376"/>
+            <a:ext cx="5796193" cy="1908627"/>
+          </a:xfrm>
+          <a:custGeom>
+            <a:avLst/>
+            <a:gdLst>
+              <a:gd name="connsiteX0" fmla="*/ 3174283 w 5796193"/>
+              <a:gd name="connsiteY0" fmla="*/ 18 h 1908627"/>
+              <a:gd name="connsiteX1" fmla="*/ 5218462 w 5796193"/>
+              <a:gd name="connsiteY1" fmla="*/ 1459807 h 1908627"/>
+              <a:gd name="connsiteX2" fmla="*/ 5309125 w 5796193"/>
+              <a:gd name="connsiteY2" fmla="*/ 1537598 h 1908627"/>
+              <a:gd name="connsiteX3" fmla="*/ 5693890 w 5796193"/>
+              <a:gd name="connsiteY3" fmla="*/ 1830997 h 1908627"/>
+              <a:gd name="connsiteX4" fmla="*/ 5796193 w 5796193"/>
+              <a:gd name="connsiteY4" fmla="*/ 1908627 h 1908627"/>
+              <a:gd name="connsiteX5" fmla="*/ 0 w 5796193"/>
+              <a:gd name="connsiteY5" fmla="*/ 1908627 h 1908627"/>
+              <a:gd name="connsiteX6" fmla="*/ 36796 w 5796193"/>
+              <a:gd name="connsiteY6" fmla="*/ 1862978 h 1908627"/>
+              <a:gd name="connsiteX7" fmla="*/ 930039 w 5796193"/>
+              <a:gd name="connsiteY7" fmla="*/ 1021399 h 1908627"/>
+              <a:gd name="connsiteX8" fmla="*/ 3174283 w 5796193"/>
+              <a:gd name="connsiteY8" fmla="*/ 18 h 1908627"/>
+            </a:gdLst>
+            <a:ahLst/>
+            <a:cxnLst>
+              <a:cxn ang="0">
+                <a:pos x="connsiteX0" y="connsiteY0"/>
+              </a:cxn>
+              <a:cxn ang="0">
+                <a:pos x="connsiteX1" y="connsiteY1"/>
+              </a:cxn>
+              <a:cxn ang="0">
+                <a:pos x="connsiteX2" y="connsiteY2"/>
+              </a:cxn>
+              <a:cxn ang="0">
+                <a:pos x="connsiteX3" y="connsiteY3"/>
+              </a:cxn>
+              <a:cxn ang="0">
+                <a:pos x="connsiteX4" y="connsiteY4"/>
+              </a:cxn>
+              <a:cxn ang="0">
+                <a:pos x="connsiteX5" y="connsiteY5"/>
+              </a:cxn>
+              <a:cxn ang="0">
+                <a:pos x="connsiteX6" y="connsiteY6"/>
+              </a:cxn>
+              <a:cxn ang="0">
+                <a:pos x="connsiteX7" y="connsiteY7"/>
+              </a:cxn>
+              <a:cxn ang="0">
+                <a:pos x="connsiteX8" y="connsiteY8"/>
+              </a:cxn>
+            </a:cxnLst>
+            <a:rect l="l" t="t" r="r" b="b"/>
+            <a:pathLst>
+              <a:path w="5796193" h="1908627">
+                <a:moveTo>
+                  <a:pt x="3174283" y="18"/>
+                </a:moveTo>
+                <a:cubicBezTo>
+                  <a:pt x="3946119" y="-4705"/>
+                  <a:pt x="4675803" y="959667"/>
+                  <a:pt x="5218462" y="1459807"/>
+                </a:cubicBezTo>
+                <a:cubicBezTo>
+                  <a:pt x="5237529" y="1477442"/>
+                  <a:pt x="5268648" y="1503898"/>
+                  <a:pt x="5309125" y="1537598"/>
+                </a:cubicBezTo>
+                <a:cubicBezTo>
+                  <a:pt x="5427311" y="1636255"/>
+                  <a:pt x="5560174" y="1732098"/>
+                  <a:pt x="5693890" y="1830997"/>
+                </a:cubicBezTo>
+                <a:lnTo>
+                  <a:pt x="5796193" y="1908627"/>
+                </a:lnTo>
+                <a:lnTo>
+                  <a:pt x="0" y="1908627"/>
+                </a:lnTo>
+                <a:lnTo>
+                  <a:pt x="36796" y="1862978"/>
+                </a:lnTo>
+                <a:cubicBezTo>
+                  <a:pt x="326152" y="1521692"/>
+                  <a:pt x="689989" y="1221705"/>
+                  <a:pt x="930039" y="1021399"/>
+                </a:cubicBezTo>
+                <a:cubicBezTo>
+                  <a:pt x="1540951" y="511494"/>
+                  <a:pt x="2324829" y="5378"/>
+                  <a:pt x="3174283" y="18"/>
+                </a:cubicBezTo>
+                <a:close/>
+              </a:path>
+            </a:pathLst>
+          </a:custGeom>
+          <a:solidFill>
+            <a:schemeClr val="accent6"/>
+          </a:solidFill>
+          <a:ln>
+            <a:noFill/>
+          </a:ln>
+        </p:spPr>
+        <p:style>
+          <a:lnRef idx="2">
+            <a:schemeClr val="accent1">
+              <a:shade val="50000"/>
+            </a:schemeClr>
+          </a:lnRef>
+          <a:fillRef idx="1">
+            <a:schemeClr val="accent1"/>
+          </a:fillRef>
+          <a:effectRef idx="0">
+            <a:schemeClr val="accent1"/>
+          </a:effectRef>
+          <a:fontRef idx="minor">
+            <a:schemeClr val="lt1"/>
+          </a:fontRef>
+        </p:style>
+        <p:txBody>
+          <a:bodyPr wrap="square" rtlCol="0" anchor="ctr">
+            <a:noAutofit/>
+          </a:bodyPr>
+          <a:lstStyle/>
+          <a:p>
+            <a:pPr algn="ctr"/>
+            <a:endParaRPr lang="en-US"/>
+          </a:p>
+        </p:txBody>
+      </p:sp>
+      <p:sp>
+        <p:nvSpPr>
+          <p:cNvPr id="2" name="Title 1">
+            <a:extLst>
+              <a:ext uri="{FF2B5EF4-FFF2-40B4-BE49-F238E27FC236}">
+                <a16:creationId xmlns:a16="http://schemas.microsoft.com/office/drawing/2014/main" id="{9427CAA2-BAE3-DE45-994D-103D93CE4948}"/>
+              </a:ext>
+            </a:extLst>
+          </p:cNvPr>
+          <p:cNvSpPr>
+            <a:spLocks noGrp="1"/>
+          </p:cNvSpPr>
+          <p:nvPr>
+            <p:ph type="title"/>
+          </p:nvPr>
+        </p:nvSpPr>
+        <p:spPr>
+          <a:xfrm>
+            <a:off x="206189" y="1516751"/>
+            <a:ext cx="5334000" cy="1524000"/>
+          </a:xfrm>
+        </p:spPr>
+        <p:txBody>
+          <a:bodyPr vert="horz" lIns="91440" tIns="45720" rIns="91440" bIns="45720" rtlCol="0">
+            <a:normAutofit/>
+          </a:bodyPr>
+          <a:lstStyle/>
+          <a:p>
+            <a:r>
+              <a:rPr lang="en-US" sz="3200" kern="1200" dirty="0">
+                <a:latin typeface="+mj-lt"/>
+                <a:ea typeface="+mj-ea"/>
+                <a:cs typeface="+mj-cs"/>
+              </a:rPr>
+              <a:t>Weather Pattern </a:t>
+            </a:r>
+          </a:p>
+        </p:txBody>
+      </p:sp>
+      <p:pic>
+        <p:nvPicPr>
+          <p:cNvPr id="5" name="Content Placeholder 4" descr="Chart, line chart&#10;&#10;Description automatically generated">
+            <a:extLst>
+              <a:ext uri="{FF2B5EF4-FFF2-40B4-BE49-F238E27FC236}">
+                <a16:creationId xmlns:a16="http://schemas.microsoft.com/office/drawing/2014/main" id="{BB6A0F7F-A09B-AD43-A371-9F891D84B779}"/>
+              </a:ext>
+            </a:extLst>
+          </p:cNvPr>
+          <p:cNvPicPr>
+            <a:picLocks noChangeAspect="1"/>
+          </p:cNvPicPr>
+          <p:nvPr/>
+        </p:nvPicPr>
+        <p:blipFill>
+          <a:blip r:embed="rId3"/>
+          <a:stretch>
+            <a:fillRect/>
+          </a:stretch>
+        </p:blipFill>
+        <p:spPr>
+          <a:xfrm>
+            <a:off x="1559859" y="3366502"/>
+            <a:ext cx="5481817" cy="3165747"/>
+          </a:xfrm>
+          <a:prstGeom prst="rect">
+            <a:avLst/>
+          </a:prstGeom>
+        </p:spPr>
+      </p:pic>
+    </p:spTree>
+    <p:extLst>
+      <p:ext uri="{BB962C8B-B14F-4D97-AF65-F5344CB8AC3E}">
+        <p14:creationId xmlns:p14="http://schemas.microsoft.com/office/powerpoint/2010/main" val="2429970452"/>
+      </p:ext>
+    </p:extLst>
+  </p:cSld>
+  <p:clrMapOvr>
+    <a:masterClrMapping/>
+  </p:clrMapOvr>
+</p:sld>
+</file>
+
+<file path=ppt/slides/slide9.xml><?xml version="1.0" encoding="utf-8"?>
+<p:sld xmlns:a="http://schemas.openxmlformats.org/drawingml/2006/main" xmlns:r="http://schemas.openxmlformats.org/officeDocument/2006/relationships" xmlns:p="http://schemas.openxmlformats.org/presentationml/2006/main">
+  <p:cSld>
+    <p:bg>
+      <p:bgPr>
+        <a:solidFill>
+          <a:schemeClr val="bg2"/>
+        </a:solidFill>
+        <a:effectLst/>
+      </p:bgPr>
+    </p:bg>
+    <p:spTree>
+      <p:nvGrpSpPr>
+        <p:cNvPr id="1" name=""/>
+        <p:cNvGrpSpPr/>
+        <p:nvPr/>
+      </p:nvGrpSpPr>
+      <p:grpSpPr>
+        <a:xfrm>
+          <a:off x="0" y="0"/>
+          <a:ext cx="0" cy="0"/>
+          <a:chOff x="0" y="0"/>
+          <a:chExt cx="0" cy="0"/>
+        </a:xfrm>
+      </p:grpSpPr>
+      <p:sp useBgFill="1">
+        <p:nvSpPr>
+          <p:cNvPr id="19" name="Rectangle 8">
+            <a:extLst>
+              <a:ext uri="{FF2B5EF4-FFF2-40B4-BE49-F238E27FC236}">
+                <a16:creationId xmlns:a16="http://schemas.microsoft.com/office/drawing/2014/main" id="{987A0FBA-CC04-4256-A8EB-BB3C543E989C}"/>
+              </a:ext>
+              <a:ext uri="{C183D7F6-B498-43B3-948B-1728B52AA6E4}">
+                <adec:decorative xmlns:adec="http://schemas.microsoft.com/office/drawing/2017/decorative" val="1"/>
+              </a:ext>
+            </a:extLst>
+          </p:cNvPr>
+          <p:cNvSpPr>
+            <a:spLocks noGrp="1" noRot="1" noChangeAspect="1" noMove="1" noResize="1" noEditPoints="1" noAdjustHandles="1" noChangeArrowheads="1" noChangeShapeType="1" noTextEdit="1"/>
+          </p:cNvSpPr>
+          <p:nvPr>
+            <p:extLst>
+              <p:ext uri="{386F3935-93C4-4BCD-93E2-E3B085C9AB24}">
+                <p16:designElem xmlns:p16="http://schemas.microsoft.com/office/powerpoint/2015/main" val="1"/>
+              </p:ext>
+            </p:extLst>
+          </p:nvPr>
+        </p:nvSpPr>
+        <p:spPr>
+          <a:xfrm>
+            <a:off x="0" y="0"/>
+            <a:ext cx="12192000" cy="6858000"/>
+          </a:xfrm>
+          <a:prstGeom prst="rect">
+            <a:avLst/>
+          </a:prstGeom>
+          <a:ln w="12700" cap="flat" cmpd="sng" algn="ctr">
+            <a:noFill/>
+            <a:prstDash val="solid"/>
+            <a:miter lim="800000"/>
+          </a:ln>
+          <a:effectLst/>
+          <a:extLst>
+            <a:ext uri="{91240B29-F687-4F45-9708-019B960494DF}">
+              <a14:hiddenLine xmlns:a14="http://schemas.microsoft.com/office/drawing/2010/main" w="12700" cap="flat" cmpd="sng" algn="ctr">
+                <a:solidFill>
+                  <a:schemeClr val="accent1">
+                    <a:shade val="50000"/>
+                  </a:schemeClr>
+                </a:solidFill>
+                <a:prstDash val="solid"/>
+                <a:miter lim="800000"/>
+              </a14:hiddenLine>
+            </a:ext>
+          </a:extLst>
+        </p:spPr>
+        <p:style>
+          <a:lnRef idx="2">
+            <a:schemeClr val="accent1">
+              <a:shade val="50000"/>
+            </a:schemeClr>
+          </a:lnRef>
+          <a:fillRef idx="1">
+            <a:schemeClr val="accent1"/>
+          </a:fillRef>
+          <a:effectRef idx="0">
+            <a:schemeClr val="accent1"/>
+          </a:effectRef>
+          <a:fontRef idx="minor">
+            <a:schemeClr val="lt1"/>
+          </a:fontRef>
+        </p:style>
+        <p:txBody>
+          <a:bodyPr rtlCol="0" anchor="ctr"/>
+          <a:lstStyle/>
+          <a:p>
+            <a:pPr algn="ctr"/>
+            <a:endParaRPr lang="en-US"/>
+          </a:p>
+        </p:txBody>
+      </p:sp>
+      <p:pic>
+        <p:nvPicPr>
+          <p:cNvPr id="20" name="Picture 4">
+            <a:extLst>
+              <a:ext uri="{FF2B5EF4-FFF2-40B4-BE49-F238E27FC236}">
+                <a16:creationId xmlns:a16="http://schemas.microsoft.com/office/drawing/2014/main" id="{43B96D64-189F-44A4-9665-FA9333F86C97}"/>
+              </a:ext>
+            </a:extLst>
+          </p:cNvPr>
+          <p:cNvPicPr>
+            <a:picLocks noChangeAspect="1"/>
+          </p:cNvPicPr>
+          <p:nvPr/>
+        </p:nvPicPr>
+        <p:blipFill rotWithShape="1">
+          <a:blip r:embed="rId2"/>
+          <a:srcRect l="43085"/>
+          <a:stretch/>
+        </p:blipFill>
+        <p:spPr>
+          <a:xfrm>
+            <a:off x="2" y="10"/>
+            <a:ext cx="5578823" cy="6028246"/>
+          </a:xfrm>
+          <a:custGeom>
+            <a:avLst/>
+            <a:gdLst/>
+            <a:ahLst/>
+            <a:cxnLst/>
+            <a:rect l="l" t="t" r="r" b="b"/>
+            <a:pathLst>
+              <a:path w="5578823" h="6028256">
+                <a:moveTo>
+                  <a:pt x="0" y="0"/>
+                </a:moveTo>
+                <a:lnTo>
+                  <a:pt x="3897606" y="0"/>
+                </a:lnTo>
+                <a:lnTo>
+                  <a:pt x="4274232" y="360545"/>
+                </a:lnTo>
+                <a:cubicBezTo>
+                  <a:pt x="4408856" y="488910"/>
+                  <a:pt x="4542134" y="615181"/>
+                  <a:pt x="4673934" y="738354"/>
+                </a:cubicBezTo>
+                <a:cubicBezTo>
+                  <a:pt x="5042663" y="1082881"/>
+                  <a:pt x="5282330" y="1428108"/>
+                  <a:pt x="5421862" y="1773839"/>
+                </a:cubicBezTo>
+                <a:cubicBezTo>
+                  <a:pt x="5631101" y="2292214"/>
+                  <a:pt x="5614731" y="2811325"/>
+                  <a:pt x="5469198" y="3329255"/>
+                </a:cubicBezTo>
+                <a:cubicBezTo>
+                  <a:pt x="5323662" y="3847185"/>
+                  <a:pt x="5048962" y="4363935"/>
+                  <a:pt x="4741546" y="4877588"/>
+                </a:cubicBezTo>
+                <a:cubicBezTo>
+                  <a:pt x="4027238" y="6071494"/>
+                  <a:pt x="2764972" y="6102970"/>
+                  <a:pt x="1325600" y="5980388"/>
+                </a:cubicBezTo>
+                <a:cubicBezTo>
+                  <a:pt x="903947" y="5944442"/>
+                  <a:pt x="499735" y="5907589"/>
+                  <a:pt x="137593" y="5804042"/>
+                </a:cubicBezTo>
+                <a:lnTo>
+                  <a:pt x="0" y="5760161"/>
+                </a:lnTo>
+                <a:close/>
+              </a:path>
+            </a:pathLst>
+          </a:custGeom>
+        </p:spPr>
+      </p:pic>
+      <p:sp>
+        <p:nvSpPr>
+          <p:cNvPr id="21" name="Freeform: Shape 10">
+            <a:extLst>
+              <a:ext uri="{FF2B5EF4-FFF2-40B4-BE49-F238E27FC236}">
+                <a16:creationId xmlns:a16="http://schemas.microsoft.com/office/drawing/2014/main" id="{E633B38B-B87A-4288-A20F-0223A6C27A5A}"/>
+              </a:ext>
+              <a:ext uri="{C183D7F6-B498-43B3-948B-1728B52AA6E4}">
+                <adec:decorative xmlns:adec="http://schemas.microsoft.com/office/drawing/2017/decorative" val="1"/>
+              </a:ext>
+            </a:extLst>
+          </p:cNvPr>
+          <p:cNvSpPr>
+            <a:spLocks noGrp="1" noRot="1" noChangeAspect="1" noMove="1" noResize="1" noEditPoints="1" noAdjustHandles="1" noChangeArrowheads="1" noChangeShapeType="1" noTextEdit="1"/>
+          </p:cNvSpPr>
+          <p:nvPr>
+            <p:extLst>
+              <p:ext uri="{386F3935-93C4-4BCD-93E2-E3B085C9AB24}">
+                <p16:designElem xmlns:p16="http://schemas.microsoft.com/office/powerpoint/2015/main" val="1"/>
+              </p:ext>
+            </p:extLst>
+          </p:nvPr>
+        </p:nvSpPr>
+        <p:spPr>
+          <a:xfrm>
+            <a:off x="-1" y="0"/>
+            <a:ext cx="5704117" cy="6096000"/>
+          </a:xfrm>
+          <a:custGeom>
+            <a:avLst/>
+            <a:gdLst>
+              <a:gd name="connsiteX0" fmla="*/ 0 w 5704117"/>
+              <a:gd name="connsiteY0" fmla="*/ 0 h 6096000"/>
+              <a:gd name="connsiteX1" fmla="*/ 4562795 w 5704117"/>
+              <a:gd name="connsiteY1" fmla="*/ 0 h 6096000"/>
+              <a:gd name="connsiteX2" fmla="*/ 4721192 w 5704117"/>
+              <a:gd name="connsiteY2" fmla="*/ 133595 h 6096000"/>
+              <a:gd name="connsiteX3" fmla="*/ 5467522 w 5704117"/>
+              <a:gd name="connsiteY3" fmla="*/ 1054328 h 6096000"/>
+              <a:gd name="connsiteX4" fmla="*/ 5538873 w 5704117"/>
+              <a:gd name="connsiteY4" fmla="*/ 2897564 h 6096000"/>
+              <a:gd name="connsiteX5" fmla="*/ 4442050 w 5704117"/>
+              <a:gd name="connsiteY5" fmla="*/ 4732407 h 6096000"/>
+              <a:gd name="connsiteX6" fmla="*/ 93046 w 5704117"/>
+              <a:gd name="connsiteY6" fmla="*/ 6082857 h 6096000"/>
+              <a:gd name="connsiteX7" fmla="*/ 0 w 5704117"/>
+              <a:gd name="connsiteY7" fmla="*/ 6078450 h 6096000"/>
+              <a:gd name="connsiteX0" fmla="*/ 4562795 w 5704117"/>
+              <a:gd name="connsiteY0" fmla="*/ 0 h 6096000"/>
+              <a:gd name="connsiteX1" fmla="*/ 4721192 w 5704117"/>
+              <a:gd name="connsiteY1" fmla="*/ 133595 h 6096000"/>
+              <a:gd name="connsiteX2" fmla="*/ 5467522 w 5704117"/>
+              <a:gd name="connsiteY2" fmla="*/ 1054328 h 6096000"/>
+              <a:gd name="connsiteX3" fmla="*/ 5538873 w 5704117"/>
+              <a:gd name="connsiteY3" fmla="*/ 2897564 h 6096000"/>
+              <a:gd name="connsiteX4" fmla="*/ 4442050 w 5704117"/>
+              <a:gd name="connsiteY4" fmla="*/ 4732407 h 6096000"/>
+              <a:gd name="connsiteX5" fmla="*/ 93046 w 5704117"/>
+              <a:gd name="connsiteY5" fmla="*/ 6082857 h 6096000"/>
+              <a:gd name="connsiteX6" fmla="*/ 0 w 5704117"/>
+              <a:gd name="connsiteY6" fmla="*/ 6078450 h 6096000"/>
+              <a:gd name="connsiteX7" fmla="*/ 91440 w 5704117"/>
+              <a:gd name="connsiteY7" fmla="*/ 91440 h 6096000"/>
+              <a:gd name="connsiteX0" fmla="*/ 4562795 w 5704117"/>
+              <a:gd name="connsiteY0" fmla="*/ 0 h 6096000"/>
+              <a:gd name="connsiteX1" fmla="*/ 4721192 w 5704117"/>
+              <a:gd name="connsiteY1" fmla="*/ 133595 h 6096000"/>
+              <a:gd name="connsiteX2" fmla="*/ 5467522 w 5704117"/>
+              <a:gd name="connsiteY2" fmla="*/ 1054328 h 6096000"/>
+              <a:gd name="connsiteX3" fmla="*/ 5538873 w 5704117"/>
+              <a:gd name="connsiteY3" fmla="*/ 2897564 h 6096000"/>
+              <a:gd name="connsiteX4" fmla="*/ 4442050 w 5704117"/>
+              <a:gd name="connsiteY4" fmla="*/ 4732407 h 6096000"/>
+              <a:gd name="connsiteX5" fmla="*/ 93046 w 5704117"/>
+              <a:gd name="connsiteY5" fmla="*/ 6082857 h 6096000"/>
+              <a:gd name="connsiteX6" fmla="*/ 0 w 5704117"/>
+              <a:gd name="connsiteY6" fmla="*/ 6078450 h 6096000"/>
+            </a:gdLst>
+            <a:ahLst/>
+            <a:cxnLst>
+              <a:cxn ang="0">
+                <a:pos x="connsiteX0" y="connsiteY0"/>
+              </a:cxn>
+              <a:cxn ang="0">
+                <a:pos x="connsiteX1" y="connsiteY1"/>
+              </a:cxn>
+              <a:cxn ang="0">
+                <a:pos x="connsiteX2" y="connsiteY2"/>
+              </a:cxn>
+              <a:cxn ang="0">
+                <a:pos x="connsiteX3" y="connsiteY3"/>
+              </a:cxn>
+              <a:cxn ang="0">
+                <a:pos x="connsiteX4" y="connsiteY4"/>
+              </a:cxn>
+              <a:cxn ang="0">
+                <a:pos x="connsiteX5" y="connsiteY5"/>
+              </a:cxn>
+              <a:cxn ang="0">
+                <a:pos x="connsiteX6" y="connsiteY6"/>
+              </a:cxn>
+            </a:cxnLst>
+            <a:rect l="l" t="t" r="r" b="b"/>
+            <a:pathLst>
+              <a:path w="5704117" h="6096000">
+                <a:moveTo>
+                  <a:pt x="4562795" y="0"/>
+                </a:moveTo>
+                <a:lnTo>
+                  <a:pt x="4721192" y="133595"/>
+                </a:lnTo>
+                <a:cubicBezTo>
+                  <a:pt x="5067135" y="440105"/>
+                  <a:pt x="5309779" y="747048"/>
+                  <a:pt x="5467522" y="1054328"/>
+                </a:cubicBezTo>
+                <a:cubicBezTo>
+                  <a:pt x="5782917" y="1668625"/>
+                  <a:pt x="5758242" y="2283795"/>
+                  <a:pt x="5538873" y="2897564"/>
+                </a:cubicBezTo>
+                <a:cubicBezTo>
+                  <a:pt x="5319500" y="3511334"/>
+                  <a:pt x="4905433" y="4123706"/>
+                  <a:pt x="4442050" y="4732407"/>
+                </a:cubicBezTo>
+                <a:cubicBezTo>
+                  <a:pt x="3499930" y="5970384"/>
+                  <a:pt x="1925433" y="6153690"/>
+                  <a:pt x="93046" y="6082857"/>
+                </a:cubicBezTo>
+                <a:lnTo>
+                  <a:pt x="0" y="6078450"/>
+                </a:lnTo>
+              </a:path>
+            </a:pathLst>
+          </a:custGeom>
+          <a:noFill/>
+          <a:ln w="19050">
+            <a:solidFill>
+              <a:schemeClr val="accent2">
+                <a:lumMod val="60000"/>
+                <a:lumOff val="40000"/>
+              </a:schemeClr>
+            </a:solidFill>
+          </a:ln>
+        </p:spPr>
+        <p:style>
+          <a:lnRef idx="2">
+            <a:schemeClr val="accent1">
+              <a:shade val="50000"/>
+            </a:schemeClr>
+          </a:lnRef>
+          <a:fillRef idx="1">
+            <a:schemeClr val="accent1"/>
+          </a:fillRef>
+          <a:effectRef idx="0">
+            <a:schemeClr val="accent1"/>
+          </a:effectRef>
+          <a:fontRef idx="minor">
+            <a:schemeClr val="lt1"/>
+          </a:fontRef>
+        </p:style>
+        <p:txBody>
+          <a:bodyPr wrap="square" rtlCol="0" anchor="ctr">
+            <a:noAutofit/>
+          </a:bodyPr>
+          <a:lstStyle/>
+          <a:p>
+            <a:pPr algn="ctr"/>
+            <a:endParaRPr lang="en-US">
+              <a:solidFill>
+                <a:prstClr val="white"/>
+              </a:solidFill>
+              <a:latin typeface="Avenir Next LT Pro Light"/>
+            </a:endParaRPr>
+          </a:p>
+        </p:txBody>
+      </p:sp>
+      <p:sp>
+        <p:nvSpPr>
+          <p:cNvPr id="22" name="Content Placeholder 2">
+            <a:extLst>
+              <a:ext uri="{FF2B5EF4-FFF2-40B4-BE49-F238E27FC236}">
+                <a16:creationId xmlns:a16="http://schemas.microsoft.com/office/drawing/2014/main" id="{F3AEC098-1AF7-5E4B-ADB4-986512FA9C70}"/>
+              </a:ext>
+            </a:extLst>
+          </p:cNvPr>
+          <p:cNvSpPr>
+            <a:spLocks noGrp="1"/>
+          </p:cNvSpPr>
+          <p:nvPr>
+            <p:ph idx="1"/>
+          </p:nvPr>
+        </p:nvSpPr>
+        <p:spPr>
+          <a:xfrm>
+            <a:off x="6096000" y="2286000"/>
+            <a:ext cx="5334000" cy="3810001"/>
+          </a:xfrm>
+        </p:spPr>
+        <p:txBody>
+          <a:bodyPr>
+            <a:normAutofit/>
+          </a:bodyPr>
+          <a:lstStyle/>
+          <a:p>
+            <a:pPr marL="0" indent="0">
+              <a:buNone/>
+            </a:pPr>
+            <a:r>
+              <a:rPr lang="en-US" sz="2400" dirty="0"/>
+              <a:t>Assumptions:</a:t>
+            </a:r>
+          </a:p>
+          <a:p>
+            <a:r>
+              <a:rPr lang="en-US" sz="2400" dirty="0"/>
+              <a:t>Linearity</a:t>
+            </a:r>
+            <a:endParaRPr lang="en-US" sz="2400" b="1" dirty="0"/>
+          </a:p>
+          <a:p>
+            <a:r>
+              <a:rPr lang="en-US" sz="2400" dirty="0"/>
+              <a:t>Independence</a:t>
+            </a:r>
+          </a:p>
+          <a:p>
+            <a:r>
+              <a:rPr lang="en-US" sz="2400" dirty="0"/>
+              <a:t>Normality</a:t>
+            </a:r>
+          </a:p>
+          <a:p>
+            <a:r>
+              <a:rPr lang="en-US" sz="2400" dirty="0"/>
+              <a:t>Homoscedasticity</a:t>
+            </a:r>
+          </a:p>
+          <a:p>
+            <a:pPr marL="0" indent="0">
+              <a:buNone/>
+            </a:pPr>
+            <a:endParaRPr lang="en-US" sz="2400" dirty="0"/>
+          </a:p>
+        </p:txBody>
+      </p:sp>
+      <p:sp>
+        <p:nvSpPr>
+          <p:cNvPr id="2" name="Title 1">
+            <a:extLst>
+              <a:ext uri="{FF2B5EF4-FFF2-40B4-BE49-F238E27FC236}">
+                <a16:creationId xmlns:a16="http://schemas.microsoft.com/office/drawing/2014/main" id="{0500382D-BBDC-7E41-8359-00FF37EC7DB7}"/>
+              </a:ext>
+            </a:extLst>
+          </p:cNvPr>
+          <p:cNvSpPr>
+            <a:spLocks noGrp="1"/>
+          </p:cNvSpPr>
+          <p:nvPr>
+            <p:ph type="title"/>
+          </p:nvPr>
+        </p:nvSpPr>
+        <p:spPr>
+          <a:xfrm>
+            <a:off x="6096000" y="762000"/>
+            <a:ext cx="5334000" cy="1524000"/>
+          </a:xfrm>
+        </p:spPr>
+        <p:txBody>
+          <a:bodyPr>
+            <a:normAutofit/>
+          </a:bodyPr>
+          <a:lstStyle/>
+          <a:p>
+            <a:r>
+              <a:rPr lang="en-US" sz="3200"/>
+              <a:t>Linear Regression Model</a:t>
+            </a:r>
+          </a:p>
+        </p:txBody>
+      </p:sp>
+    </p:spTree>
+    <p:extLst>
+      <p:ext uri="{BB962C8B-B14F-4D97-AF65-F5344CB8AC3E}">
+        <p14:creationId xmlns:p14="http://schemas.microsoft.com/office/powerpoint/2010/main" val="2220735404"/>
       </p:ext>
     </p:extLst>
   </p:cSld>

</xml_diff>